<commit_message>
added the filter method page
</commit_message>
<xml_diff>
--- a/Project_NaCl/Project_DO.pptx
+++ b/Project_NaCl/Project_DO.pptx
@@ -6286,7 +6286,7 @@
           <a:p>
             <a:fld id="{004A8D02-4E65-4CCD-8312-4AB164C6C77D}" type="datetimeFigureOut">
               <a:rPr lang="en-US"/>
-              <a:t>12/16/19</a:t>
+              <a:t>12/17/19</a:t>
             </a:fld>
             <a:endParaRPr/>
           </a:p>
@@ -6451,7 +6451,7 @@
           <a:p>
             <a:fld id="{67A755D9-D361-47B8-9652-3B4EA9776CE5}" type="datetimeFigureOut">
               <a:rPr lang="en-US"/>
-              <a:t>12/16/19</a:t>
+              <a:t>12/17/19</a:t>
             </a:fld>
             <a:endParaRPr/>
           </a:p>
@@ -6714,6 +6714,93 @@
 </file>
 
 <file path=ppt/notesSlides/notesSlide1.xml><?xml version="1.0" encoding="utf-8"?>
+<p:notes xmlns:a="http://schemas.openxmlformats.org/drawingml/2006/main" xmlns:r="http://schemas.openxmlformats.org/officeDocument/2006/relationships" xmlns:p="http://schemas.openxmlformats.org/presentationml/2006/main">
+  <p:cSld>
+    <p:spTree>
+      <p:nvGrpSpPr>
+        <p:cNvPr id="1" name=""/>
+        <p:cNvGrpSpPr/>
+        <p:nvPr/>
+      </p:nvGrpSpPr>
+      <p:grpSpPr>
+        <a:xfrm>
+          <a:off x="0" y="0"/>
+          <a:ext cx="0" cy="0"/>
+          <a:chOff x="0" y="0"/>
+          <a:chExt cx="0" cy="0"/>
+        </a:xfrm>
+      </p:grpSpPr>
+      <p:sp>
+        <p:nvSpPr>
+          <p:cNvPr id="2" name="Slide Image Placeholder 1"/>
+          <p:cNvSpPr>
+            <a:spLocks noGrp="1" noRot="1" noChangeAspect="1"/>
+          </p:cNvSpPr>
+          <p:nvPr>
+            <p:ph type="sldImg"/>
+          </p:nvPr>
+        </p:nvSpPr>
+        <p:spPr/>
+      </p:sp>
+      <p:sp>
+        <p:nvSpPr>
+          <p:cNvPr id="3" name="Notes Placeholder 2"/>
+          <p:cNvSpPr>
+            <a:spLocks noGrp="1"/>
+          </p:cNvSpPr>
+          <p:nvPr>
+            <p:ph type="body" idx="1"/>
+          </p:nvPr>
+        </p:nvSpPr>
+        <p:spPr/>
+        <p:txBody>
+          <a:bodyPr/>
+          <a:lstStyle/>
+          <a:p>
+            <a:r>
+              <a:rPr lang="en-US"/>
+              <a:t>17 SAG_3D_T1</a:t>
+            </a:r>
+          </a:p>
+        </p:txBody>
+      </p:sp>
+      <p:sp>
+        <p:nvSpPr>
+          <p:cNvPr id="4" name="Slide Number Placeholder 3"/>
+          <p:cNvSpPr>
+            <a:spLocks noGrp="1"/>
+          </p:cNvSpPr>
+          <p:nvPr>
+            <p:ph type="sldNum" sz="quarter" idx="5"/>
+          </p:nvPr>
+        </p:nvSpPr>
+        <p:spPr/>
+        <p:txBody>
+          <a:bodyPr/>
+          <a:lstStyle/>
+          <a:p>
+            <a:fld id="{E3B36274-F2B9-4C45-BBB4-0EDF4CD651A7}" type="slidenum">
+              <a:rPr lang="en-US" smtClean="0"/>
+              <a:t>4</a:t>
+            </a:fld>
+            <a:endParaRPr lang="en-US"/>
+          </a:p>
+        </p:txBody>
+      </p:sp>
+    </p:spTree>
+    <p:extLst>
+      <p:ext uri="{BB962C8B-B14F-4D97-AF65-F5344CB8AC3E}">
+        <p14:creationId xmlns:p14="http://schemas.microsoft.com/office/powerpoint/2010/main" val="87315322"/>
+      </p:ext>
+    </p:extLst>
+  </p:cSld>
+  <p:clrMapOvr>
+    <a:masterClrMapping/>
+  </p:clrMapOvr>
+</p:notes>
+</file>
+
+<file path=ppt/notesSlides/notesSlide2.xml><?xml version="1.0" encoding="utf-8"?>
 <p:notes xmlns:a="http://schemas.openxmlformats.org/drawingml/2006/main" xmlns:r="http://schemas.openxmlformats.org/officeDocument/2006/relationships" xmlns:p="http://schemas.openxmlformats.org/presentationml/2006/main">
   <p:cSld>
     <p:spTree>
@@ -7282,7 +7369,7 @@
           <a:p>
             <a:fld id="{83829175-527E-46A3-863C-1BB1F163B849}" type="datetimeFigureOut">
               <a:rPr lang="en-US" smtClean="0"/>
-              <a:t>12/16/19</a:t>
+              <a:t>12/17/19</a:t>
             </a:fld>
             <a:endParaRPr lang="en-US"/>
           </a:p>
@@ -7483,7 +7570,7 @@
           <a:p>
             <a:fld id="{83829175-527E-46A3-863C-1BB1F163B849}" type="datetimeFigureOut">
               <a:rPr lang="en-US" smtClean="0"/>
-              <a:t>12/16/19</a:t>
+              <a:t>12/17/19</a:t>
             </a:fld>
             <a:endParaRPr lang="en-US"/>
           </a:p>
@@ -7694,7 +7781,7 @@
           <a:p>
             <a:fld id="{83829175-527E-46A3-863C-1BB1F163B849}" type="datetimeFigureOut">
               <a:rPr lang="en-US" smtClean="0"/>
-              <a:t>12/16/19</a:t>
+              <a:t>12/17/19</a:t>
             </a:fld>
             <a:endParaRPr lang="en-US"/>
           </a:p>
@@ -7895,7 +7982,7 @@
           <a:p>
             <a:fld id="{83829175-527E-46A3-863C-1BB1F163B849}" type="datetimeFigureOut">
               <a:rPr lang="en-US" smtClean="0"/>
-              <a:t>12/16/19</a:t>
+              <a:t>12/17/19</a:t>
             </a:fld>
             <a:endParaRPr lang="en-US"/>
           </a:p>
@@ -8171,7 +8258,7 @@
           <a:p>
             <a:fld id="{83829175-527E-46A3-863C-1BB1F163B849}" type="datetimeFigureOut">
               <a:rPr lang="en-US" smtClean="0"/>
-              <a:t>12/16/19</a:t>
+              <a:t>12/17/19</a:t>
             </a:fld>
             <a:endParaRPr lang="en-US" dirty="0"/>
           </a:p>
@@ -8488,7 +8575,7 @@
           <a:p>
             <a:fld id="{83829175-527E-46A3-863C-1BB1F163B849}" type="datetimeFigureOut">
               <a:rPr lang="en-US" smtClean="0"/>
-              <a:t>12/16/19</a:t>
+              <a:t>12/17/19</a:t>
             </a:fld>
             <a:endParaRPr lang="en-US" dirty="0"/>
           </a:p>
@@ -8956,7 +9043,7 @@
           <a:p>
             <a:fld id="{83829175-527E-46A3-863C-1BB1F163B849}" type="datetimeFigureOut">
               <a:rPr lang="en-US" smtClean="0"/>
-              <a:t>12/16/19</a:t>
+              <a:t>12/17/19</a:t>
             </a:fld>
             <a:endParaRPr lang="en-US"/>
           </a:p>
@@ -9089,7 +9176,7 @@
           <a:p>
             <a:fld id="{83829175-527E-46A3-863C-1BB1F163B849}" type="datetimeFigureOut">
               <a:rPr lang="en-US" smtClean="0"/>
-              <a:t>12/16/19</a:t>
+              <a:t>12/17/19</a:t>
             </a:fld>
             <a:endParaRPr lang="en-US"/>
           </a:p>
@@ -9199,7 +9286,7 @@
           <a:p>
             <a:fld id="{83829175-527E-46A3-863C-1BB1F163B849}" type="datetimeFigureOut">
               <a:rPr lang="en-US" smtClean="0"/>
-              <a:t>12/16/19</a:t>
+              <a:t>12/17/19</a:t>
             </a:fld>
             <a:endParaRPr lang="en-US"/>
           </a:p>
@@ -9501,7 +9588,7 @@
             <a:fld id="{83829175-527E-46A3-863C-1BB1F163B849}" type="datetimeFigureOut">
               <a:rPr lang="en-US" smtClean="0"/>
               <a:pPr/>
-              <a:t>12/16/19</a:t>
+              <a:t>12/17/19</a:t>
             </a:fld>
             <a:endParaRPr lang="en-US"/>
           </a:p>
@@ -9797,7 +9884,7 @@
             <a:fld id="{83829175-527E-46A3-863C-1BB1F163B849}" type="datetimeFigureOut">
               <a:rPr lang="en-US" smtClean="0"/>
               <a:pPr/>
-              <a:t>12/16/19</a:t>
+              <a:t>12/17/19</a:t>
             </a:fld>
             <a:endParaRPr lang="en-US"/>
           </a:p>
@@ -10076,7 +10163,7 @@
             <a:fld id="{83829175-527E-46A3-863C-1BB1F163B849}" type="datetimeFigureOut">
               <a:rPr lang="en-US" smtClean="0"/>
               <a:pPr/>
-              <a:t>12/16/19</a:t>
+              <a:t>12/17/19</a:t>
             </a:fld>
             <a:endParaRPr lang="en-US"/>
           </a:p>
@@ -11299,40 +11386,57 @@
             <p:ph sz="half" idx="1"/>
           </p:nvPr>
         </p:nvSpPr>
-        <p:spPr/>
+        <p:spPr>
+          <a:xfrm>
+            <a:off x="1065212" y="1828800"/>
+            <a:ext cx="5257800" cy="4191000"/>
+          </a:xfrm>
+        </p:spPr>
         <p:txBody>
           <a:bodyPr/>
           <a:lstStyle/>
           <a:p>
+            <a:pPr marL="457200" indent="-457200">
+              <a:buAutoNum type="arabicPeriod"/>
+            </a:pPr>
             <a:r>
               <a:rPr lang="en-US" dirty="0"/>
-              <a:t>Essential </a:t>
+              <a:t>Get rid of post processing</a:t>
             </a:r>
           </a:p>
-        </p:txBody>
-      </p:sp>
-      <p:sp>
-        <p:nvSpPr>
-          <p:cNvPr id="4" name="Content Placeholder 3">
-            <a:extLst>
-              <a:ext uri="{FF2B5EF4-FFF2-40B4-BE49-F238E27FC236}">
-                <a16:creationId xmlns:a16="http://schemas.microsoft.com/office/drawing/2014/main" id="{89542C83-7859-A44B-80C6-A50B57D929FA}"/>
-              </a:ext>
-            </a:extLst>
-          </p:cNvPr>
-          <p:cNvSpPr>
-            <a:spLocks noGrp="1"/>
-          </p:cNvSpPr>
-          <p:nvPr>
-            <p:ph sz="half" idx="2"/>
-          </p:nvPr>
-        </p:nvSpPr>
-        <p:spPr/>
-        <p:txBody>
-          <a:bodyPr/>
-          <a:lstStyle/>
-          <a:p>
-            <a:endParaRPr lang="en-US"/>
+          <a:p>
+            <a:pPr lvl="1"/>
+            <a:r>
+              <a:rPr lang="en-US" dirty="0"/>
+              <a:t>If the series number &gt;2 and &lt;100</a:t>
+            </a:r>
+          </a:p>
+          <a:p>
+            <a:pPr marL="457200" indent="-457200">
+              <a:buAutoNum type="arabicPeriod"/>
+            </a:pPr>
+            <a:r>
+              <a:rPr lang="en-US" dirty="0"/>
+              <a:t>FSPGR/FLAIR/T2—3D acquisitions only </a:t>
+            </a:r>
+          </a:p>
+          <a:p>
+            <a:pPr marL="457200" indent="-457200">
+              <a:buAutoNum type="arabicPeriod"/>
+            </a:pPr>
+            <a:r>
+              <a:rPr lang="en-US" dirty="0"/>
+              <a:t>Ignored experimental scans (i.e. BRAVO)</a:t>
+            </a:r>
+          </a:p>
+          <a:p>
+            <a:pPr marL="457200" indent="-457200">
+              <a:buAutoNum type="arabicPeriod"/>
+            </a:pPr>
+            <a:r>
+              <a:rPr lang="en-US" dirty="0"/>
+              <a:t>Established a Standard file naming convention </a:t>
+            </a:r>
           </a:p>
         </p:txBody>
       </p:sp>

</xml_diff>

<commit_message>
update since ke left to china
</commit_message>
<xml_diff>
--- a/Project_NaCl/Project_DO.pptx
+++ b/Project_NaCl/Project_DO.pptx
@@ -5,10 +5,10 @@
     <p:sldMasterId id="2147483660" r:id="rId1"/>
   </p:sldMasterIdLst>
   <p:notesMasterIdLst>
-    <p:notesMasterId r:id="rId14"/>
+    <p:notesMasterId r:id="rId15"/>
   </p:notesMasterIdLst>
   <p:handoutMasterIdLst>
-    <p:handoutMasterId r:id="rId15"/>
+    <p:handoutMasterId r:id="rId16"/>
   </p:handoutMasterIdLst>
   <p:sldIdLst>
     <p:sldId id="257" r:id="rId2"/>
@@ -16,13 +16,14 @@
     <p:sldId id="272" r:id="rId4"/>
     <p:sldId id="276" r:id="rId5"/>
     <p:sldId id="275" r:id="rId6"/>
-    <p:sldId id="258" r:id="rId7"/>
-    <p:sldId id="263" r:id="rId8"/>
-    <p:sldId id="270" r:id="rId9"/>
-    <p:sldId id="273" r:id="rId10"/>
-    <p:sldId id="262" r:id="rId11"/>
-    <p:sldId id="274" r:id="rId12"/>
-    <p:sldId id="264" r:id="rId13"/>
+    <p:sldId id="277" r:id="rId7"/>
+    <p:sldId id="258" r:id="rId8"/>
+    <p:sldId id="263" r:id="rId9"/>
+    <p:sldId id="270" r:id="rId10"/>
+    <p:sldId id="273" r:id="rId11"/>
+    <p:sldId id="262" r:id="rId12"/>
+    <p:sldId id="274" r:id="rId13"/>
+    <p:sldId id="264" r:id="rId14"/>
   </p:sldIdLst>
   <p:sldSz cx="12188825" cy="6858000"/>
   <p:notesSz cx="6858000" cy="9144000"/>
@@ -6286,7 +6287,7 @@
           <a:p>
             <a:fld id="{004A8D02-4E65-4CCD-8312-4AB164C6C77D}" type="datetimeFigureOut">
               <a:rPr lang="en-US"/>
-              <a:t>12/17/19</a:t>
+              <a:t>12/18/19</a:t>
             </a:fld>
             <a:endParaRPr/>
           </a:p>
@@ -6451,7 +6452,7 @@
           <a:p>
             <a:fld id="{67A755D9-D361-47B8-9652-3B4EA9776CE5}" type="datetimeFigureOut">
               <a:rPr lang="en-US"/>
-              <a:t>12/17/19</a:t>
+              <a:t>12/18/19</a:t>
             </a:fld>
             <a:endParaRPr/>
           </a:p>
@@ -7369,7 +7370,7 @@
           <a:p>
             <a:fld id="{83829175-527E-46A3-863C-1BB1F163B849}" type="datetimeFigureOut">
               <a:rPr lang="en-US" smtClean="0"/>
-              <a:t>12/17/19</a:t>
+              <a:t>12/18/19</a:t>
             </a:fld>
             <a:endParaRPr lang="en-US"/>
           </a:p>
@@ -7570,7 +7571,7 @@
           <a:p>
             <a:fld id="{83829175-527E-46A3-863C-1BB1F163B849}" type="datetimeFigureOut">
               <a:rPr lang="en-US" smtClean="0"/>
-              <a:t>12/17/19</a:t>
+              <a:t>12/18/19</a:t>
             </a:fld>
             <a:endParaRPr lang="en-US"/>
           </a:p>
@@ -7781,7 +7782,7 @@
           <a:p>
             <a:fld id="{83829175-527E-46A3-863C-1BB1F163B849}" type="datetimeFigureOut">
               <a:rPr lang="en-US" smtClean="0"/>
-              <a:t>12/17/19</a:t>
+              <a:t>12/18/19</a:t>
             </a:fld>
             <a:endParaRPr lang="en-US"/>
           </a:p>
@@ -7982,7 +7983,7 @@
           <a:p>
             <a:fld id="{83829175-527E-46A3-863C-1BB1F163B849}" type="datetimeFigureOut">
               <a:rPr lang="en-US" smtClean="0"/>
-              <a:t>12/17/19</a:t>
+              <a:t>12/18/19</a:t>
             </a:fld>
             <a:endParaRPr lang="en-US"/>
           </a:p>
@@ -8258,7 +8259,7 @@
           <a:p>
             <a:fld id="{83829175-527E-46A3-863C-1BB1F163B849}" type="datetimeFigureOut">
               <a:rPr lang="en-US" smtClean="0"/>
-              <a:t>12/17/19</a:t>
+              <a:t>12/18/19</a:t>
             </a:fld>
             <a:endParaRPr lang="en-US" dirty="0"/>
           </a:p>
@@ -8575,7 +8576,7 @@
           <a:p>
             <a:fld id="{83829175-527E-46A3-863C-1BB1F163B849}" type="datetimeFigureOut">
               <a:rPr lang="en-US" smtClean="0"/>
-              <a:t>12/17/19</a:t>
+              <a:t>12/18/19</a:t>
             </a:fld>
             <a:endParaRPr lang="en-US" dirty="0"/>
           </a:p>
@@ -9043,7 +9044,7 @@
           <a:p>
             <a:fld id="{83829175-527E-46A3-863C-1BB1F163B849}" type="datetimeFigureOut">
               <a:rPr lang="en-US" smtClean="0"/>
-              <a:t>12/17/19</a:t>
+              <a:t>12/18/19</a:t>
             </a:fld>
             <a:endParaRPr lang="en-US"/>
           </a:p>
@@ -9176,7 +9177,7 @@
           <a:p>
             <a:fld id="{83829175-527E-46A3-863C-1BB1F163B849}" type="datetimeFigureOut">
               <a:rPr lang="en-US" smtClean="0"/>
-              <a:t>12/17/19</a:t>
+              <a:t>12/18/19</a:t>
             </a:fld>
             <a:endParaRPr lang="en-US"/>
           </a:p>
@@ -9286,7 +9287,7 @@
           <a:p>
             <a:fld id="{83829175-527E-46A3-863C-1BB1F163B849}" type="datetimeFigureOut">
               <a:rPr lang="en-US" smtClean="0"/>
-              <a:t>12/17/19</a:t>
+              <a:t>12/18/19</a:t>
             </a:fld>
             <a:endParaRPr lang="en-US"/>
           </a:p>
@@ -9588,7 +9589,7 @@
             <a:fld id="{83829175-527E-46A3-863C-1BB1F163B849}" type="datetimeFigureOut">
               <a:rPr lang="en-US" smtClean="0"/>
               <a:pPr/>
-              <a:t>12/17/19</a:t>
+              <a:t>12/18/19</a:t>
             </a:fld>
             <a:endParaRPr lang="en-US"/>
           </a:p>
@@ -9884,7 +9885,7 @@
             <a:fld id="{83829175-527E-46A3-863C-1BB1F163B849}" type="datetimeFigureOut">
               <a:rPr lang="en-US" smtClean="0"/>
               <a:pPr/>
-              <a:t>12/17/19</a:t>
+              <a:t>12/18/19</a:t>
             </a:fld>
             <a:endParaRPr lang="en-US"/>
           </a:p>
@@ -10163,7 +10164,7 @@
             <a:fld id="{83829175-527E-46A3-863C-1BB1F163B849}" type="datetimeFigureOut">
               <a:rPr lang="en-US" smtClean="0"/>
               <a:pPr/>
-              <a:t>12/17/19</a:t>
+              <a:t>12/18/19</a:t>
             </a:fld>
             <a:endParaRPr lang="en-US"/>
           </a:p>
@@ -10671,15 +10672,91 @@
           <a:p>
             <a:r>
               <a:rPr lang="en-US" dirty="0"/>
-              <a:t>Add a Slide Title - 3</a:t>
+              <a:t>Add a Slide Title - 2</a:t>
             </a:r>
+          </a:p>
+        </p:txBody>
+      </p:sp>
+      <p:sp>
+        <p:nvSpPr>
+          <p:cNvPr id="3" name="Text Placeholder 2"/>
+          <p:cNvSpPr>
+            <a:spLocks noGrp="1"/>
+          </p:cNvSpPr>
+          <p:nvPr>
+            <p:ph type="body" idx="1"/>
+          </p:nvPr>
+        </p:nvSpPr>
+        <p:spPr/>
+        <p:txBody>
+          <a:bodyPr/>
+          <a:lstStyle/>
+          <a:p>
+            <a:endParaRPr lang="en-US"/>
+          </a:p>
+        </p:txBody>
+      </p:sp>
+      <p:sp>
+        <p:nvSpPr>
+          <p:cNvPr id="4" name="Content Placeholder 3"/>
+          <p:cNvSpPr>
+            <a:spLocks noGrp="1"/>
+          </p:cNvSpPr>
+          <p:nvPr>
+            <p:ph sz="half" idx="2"/>
+          </p:nvPr>
+        </p:nvSpPr>
+        <p:spPr/>
+        <p:txBody>
+          <a:bodyPr/>
+          <a:lstStyle/>
+          <a:p>
+            <a:endParaRPr lang="en-US"/>
+          </a:p>
+        </p:txBody>
+      </p:sp>
+      <p:sp>
+        <p:nvSpPr>
+          <p:cNvPr id="5" name="Text Placeholder 4"/>
+          <p:cNvSpPr>
+            <a:spLocks noGrp="1"/>
+          </p:cNvSpPr>
+          <p:nvPr>
+            <p:ph type="body" sz="quarter" idx="3"/>
+          </p:nvPr>
+        </p:nvSpPr>
+        <p:spPr/>
+        <p:txBody>
+          <a:bodyPr/>
+          <a:lstStyle/>
+          <a:p>
+            <a:endParaRPr lang="en-US"/>
+          </a:p>
+        </p:txBody>
+      </p:sp>
+      <p:sp>
+        <p:nvSpPr>
+          <p:cNvPr id="6" name="Content Placeholder 5"/>
+          <p:cNvSpPr>
+            <a:spLocks noGrp="1"/>
+          </p:cNvSpPr>
+          <p:nvPr>
+            <p:ph sz="quarter" idx="4"/>
+          </p:nvPr>
+        </p:nvSpPr>
+        <p:spPr/>
+        <p:txBody>
+          <a:bodyPr/>
+          <a:lstStyle/>
+          <a:p>
+            <a:endParaRPr lang="en-US"/>
           </a:p>
         </p:txBody>
       </p:sp>
     </p:spTree>
     <p:extLst>
       <p:ext uri="{BB962C8B-B14F-4D97-AF65-F5344CB8AC3E}">
-        <p14:creationId xmlns:p14="http://schemas.microsoft.com/office/powerpoint/2010/main" val="4046713945"/>
+        <p14:creationId xmlns:p14="http://schemas.microsoft.com/office/powerpoint/2010/main" val="533970288"/>
       </p:ext>
     </p:extLst>
   </p:cSld>
@@ -10735,6 +10812,70 @@
           <a:p>
             <a:r>
               <a:rPr lang="en-US" dirty="0"/>
+              <a:t>Add a Slide Title - 3</a:t>
+            </a:r>
+          </a:p>
+        </p:txBody>
+      </p:sp>
+    </p:spTree>
+    <p:extLst>
+      <p:ext uri="{BB962C8B-B14F-4D97-AF65-F5344CB8AC3E}">
+        <p14:creationId xmlns:p14="http://schemas.microsoft.com/office/powerpoint/2010/main" val="4046713945"/>
+      </p:ext>
+    </p:extLst>
+  </p:cSld>
+  <p:clrMapOvr>
+    <a:masterClrMapping/>
+  </p:clrMapOvr>
+  <mc:AlternateContent xmlns:mc="http://schemas.openxmlformats.org/markup-compatibility/2006" xmlns:p14="http://schemas.microsoft.com/office/powerpoint/2010/main">
+    <mc:Choice Requires="p14">
+      <p:transition spd="med" p14:dur="700">
+        <p:fade/>
+      </p:transition>
+    </mc:Choice>
+    <mc:Fallback xmlns="">
+      <p:transition spd="med">
+        <p:fade/>
+      </p:transition>
+    </mc:Fallback>
+  </mc:AlternateContent>
+</p:sld>
+</file>
+
+<file path=ppt/slides/slide12.xml><?xml version="1.0" encoding="utf-8"?>
+<p:sld xmlns:a="http://schemas.openxmlformats.org/drawingml/2006/main" xmlns:r="http://schemas.openxmlformats.org/officeDocument/2006/relationships" xmlns:p="http://schemas.openxmlformats.org/presentationml/2006/main">
+  <p:cSld>
+    <p:spTree>
+      <p:nvGrpSpPr>
+        <p:cNvPr id="1" name=""/>
+        <p:cNvGrpSpPr/>
+        <p:nvPr/>
+      </p:nvGrpSpPr>
+      <p:grpSpPr>
+        <a:xfrm>
+          <a:off x="0" y="0"/>
+          <a:ext cx="0" cy="0"/>
+          <a:chOff x="0" y="0"/>
+          <a:chExt cx="0" cy="0"/>
+        </a:xfrm>
+      </p:grpSpPr>
+      <p:sp>
+        <p:nvSpPr>
+          <p:cNvPr id="2" name="Title 1"/>
+          <p:cNvSpPr>
+            <a:spLocks noGrp="1"/>
+          </p:cNvSpPr>
+          <p:nvPr>
+            <p:ph type="title"/>
+          </p:nvPr>
+        </p:nvSpPr>
+        <p:spPr/>
+        <p:txBody>
+          <a:bodyPr/>
+          <a:lstStyle/>
+          <a:p>
+            <a:r>
+              <a:rPr lang="en-US" dirty="0"/>
               <a:t>Add a Slide Title - 4</a:t>
             </a:r>
           </a:p>
@@ -10803,7 +10944,7 @@
 </p:sld>
 </file>
 
-<file path=ppt/slides/slide12.xml><?xml version="1.0" encoding="utf-8"?>
+<file path=ppt/slides/slide13.xml><?xml version="1.0" encoding="utf-8"?>
 <p:sld xmlns:a="http://schemas.openxmlformats.org/drawingml/2006/main" xmlns:r="http://schemas.openxmlformats.org/officeDocument/2006/relationships" xmlns:p="http://schemas.openxmlformats.org/presentationml/2006/main">
   <p:cSld>
     <p:spTree>
@@ -11389,7 +11530,7 @@
         <p:spPr>
           <a:xfrm>
             <a:off x="1065212" y="1828800"/>
-            <a:ext cx="5257800" cy="4191000"/>
+            <a:ext cx="9753600" cy="4191000"/>
           </a:xfrm>
         </p:spPr>
         <p:txBody>
@@ -11417,11 +11558,11 @@
             </a:pPr>
             <a:r>
               <a:rPr lang="en-US" dirty="0"/>
-              <a:t>FSPGR/FLAIR/T2—3D acquisitions only </a:t>
+              <a:t>Established a Standard file naming convention </a:t>
             </a:r>
           </a:p>
           <a:p>
-            <a:pPr marL="457200" indent="-457200">
+            <a:pPr marL="736282" lvl="1" indent="-457200">
               <a:buAutoNum type="arabicPeriod"/>
             </a:pPr>
             <a:r>
@@ -11435,8 +11576,28 @@
             </a:pPr>
             <a:r>
               <a:rPr lang="en-US" dirty="0"/>
-              <a:t>Established a Standard file naming convention </a:t>
+              <a:t>Extracted location and VENC for phase contract scans (i.e. PC_AQ_(VENC 10))</a:t>
             </a:r>
+          </a:p>
+          <a:p>
+            <a:pPr marL="974725" lvl="2" indent="-457200"/>
+            <a:r>
+              <a:rPr lang="en-US" dirty="0"/>
+              <a:t>If VENC or location is missing from in the file name, we filter it out right now</a:t>
+            </a:r>
+          </a:p>
+          <a:p>
+            <a:pPr marL="974725" lvl="2" indent="-457200"/>
+            <a:r>
+              <a:rPr lang="en-US" dirty="0"/>
+              <a:t>will add them back in after double check the scan</a:t>
+            </a:r>
+          </a:p>
+          <a:p>
+            <a:pPr marL="457200" indent="-457200">
+              <a:buAutoNum type="arabicPeriod"/>
+            </a:pPr>
+            <a:endParaRPr lang="en-US" dirty="0"/>
           </a:p>
         </p:txBody>
       </p:sp>
@@ -11534,7 +11695,9 @@
           </a:xfrm>
         </p:spPr>
         <p:txBody>
-          <a:bodyPr/>
+          <a:bodyPr>
+            <a:normAutofit/>
+          </a:bodyPr>
           <a:lstStyle/>
           <a:p>
             <a:r>
@@ -11573,55 +11736,57 @@
           <a:p>
             <a:r>
               <a:rPr lang="en-US" dirty="0"/>
-              <a:t>Scan Specific: &lt;plane&gt;_{CUBE}_sequence_&lt;location&gt;_(Notes)</a:t>
+              <a:t>Scan Specific: &lt;plane&gt;_sequence_&lt;location&gt;_(Notes)</a:t>
             </a:r>
           </a:p>
           <a:p>
             <a:pPr lvl="1"/>
             <a:r>
               <a:rPr lang="en-US" dirty="0"/>
-              <a:t>Plane: SAG | COR | AX | OBL</a:t>
+              <a:t>Plane: SAG | COR | AX </a:t>
             </a:r>
           </a:p>
           <a:p>
             <a:pPr lvl="1"/>
             <a:r>
               <a:rPr lang="en-US" dirty="0"/>
-              <a:t>CUBE if specified</a:t>
+              <a:t>Sequence name: FSPGR_3D, CUBE_FLAIR, SWI, PC</a:t>
             </a:r>
           </a:p>
           <a:p>
             <a:pPr lvl="1"/>
             <a:r>
               <a:rPr lang="en-US" dirty="0"/>
-              <a:t>Sequence name: FSPGR, SWI, PC</a:t>
+              <a:t>Location: default is the whole brain, if is a part inside the brain please specify </a:t>
+            </a:r>
+          </a:p>
+          <a:p>
+            <a:pPr lvl="2"/>
+            <a:r>
+              <a:rPr lang="en-US" dirty="0"/>
+              <a:t>AQ, C2, Carotids, etc.</a:t>
             </a:r>
           </a:p>
           <a:p>
             <a:pPr lvl="1"/>
             <a:r>
               <a:rPr lang="en-US" dirty="0"/>
-              <a:t>Location: default is the whole brain, if is a part inside the brain please specify</a:t>
+              <a:t>Notes </a:t>
             </a:r>
           </a:p>
           <a:p>
-            <a:pPr lvl="1"/>
+            <a:pPr lvl="2"/>
             <a:r>
               <a:rPr lang="en-US" dirty="0"/>
-              <a:t>Ex: SAG_CUBE_FSPGR_(RE), AX_FLAIR_SPINE,  AX_PC_</a:t>
+              <a:t>PC: we are looking for VENC</a:t>
             </a:r>
           </a:p>
           <a:p>
-            <a:pPr lvl="1"/>
-            <a:endParaRPr lang="en-US" dirty="0"/>
-          </a:p>
-          <a:p>
-            <a:pPr lvl="1"/>
-            <a:endParaRPr lang="en-US" dirty="0"/>
-          </a:p>
-          <a:p>
             <a:pPr lvl="2"/>
-            <a:endParaRPr lang="en-US" dirty="0"/>
+            <a:r>
+              <a:rPr lang="en-US" dirty="0"/>
+              <a:t>BOLD_(HYPERCAPNIA) </a:t>
+            </a:r>
           </a:p>
         </p:txBody>
       </p:sp>
@@ -11669,6 +11834,121 @@
       </p:grpSpPr>
       <p:sp>
         <p:nvSpPr>
+          <p:cNvPr id="2" name="Title 1">
+            <a:extLst>
+              <a:ext uri="{FF2B5EF4-FFF2-40B4-BE49-F238E27FC236}">
+                <a16:creationId xmlns:a16="http://schemas.microsoft.com/office/drawing/2014/main" id="{E76E0C9A-EB9B-334D-848B-CBB9A578A989}"/>
+              </a:ext>
+            </a:extLst>
+          </p:cNvPr>
+          <p:cNvSpPr>
+            <a:spLocks noGrp="1"/>
+          </p:cNvSpPr>
+          <p:nvPr>
+            <p:ph type="title"/>
+          </p:nvPr>
+        </p:nvSpPr>
+        <p:spPr/>
+        <p:txBody>
+          <a:bodyPr/>
+          <a:lstStyle/>
+          <a:p>
+            <a:r>
+              <a:rPr lang="en-US" dirty="0"/>
+              <a:t>Question we have </a:t>
+            </a:r>
+          </a:p>
+        </p:txBody>
+      </p:sp>
+      <p:sp>
+        <p:nvSpPr>
+          <p:cNvPr id="3" name="Content Placeholder 2">
+            <a:extLst>
+              <a:ext uri="{FF2B5EF4-FFF2-40B4-BE49-F238E27FC236}">
+                <a16:creationId xmlns:a16="http://schemas.microsoft.com/office/drawing/2014/main" id="{D6E58F10-FE64-BF44-BFAD-0C804140BC43}"/>
+              </a:ext>
+            </a:extLst>
+          </p:cNvPr>
+          <p:cNvSpPr>
+            <a:spLocks noGrp="1"/>
+          </p:cNvSpPr>
+          <p:nvPr>
+            <p:ph idx="1"/>
+          </p:nvPr>
+        </p:nvSpPr>
+        <p:spPr/>
+        <p:txBody>
+          <a:bodyPr/>
+          <a:lstStyle/>
+          <a:p>
+            <a:r>
+              <a:rPr lang="en-US" dirty="0"/>
+              <a:t>For CSF Flow: is it conventional to not prescribe the plane?</a:t>
+            </a:r>
+          </a:p>
+          <a:p>
+            <a:pPr lvl="1"/>
+            <a:r>
+              <a:rPr lang="en-US" dirty="0"/>
+              <a:t>AX_PC_AQ_(VEN 10) vs PC_AQ_(VENT 10)</a:t>
+            </a:r>
+          </a:p>
+          <a:p>
+            <a:r>
+              <a:rPr lang="en-US" dirty="0"/>
+              <a:t>For FLAIR: if not specified, can we assume T2 FLAIR</a:t>
+            </a:r>
+          </a:p>
+          <a:p>
+            <a:pPr lvl="1"/>
+            <a:endParaRPr lang="en-US" dirty="0"/>
+          </a:p>
+        </p:txBody>
+      </p:sp>
+    </p:spTree>
+    <p:extLst>
+      <p:ext uri="{BB962C8B-B14F-4D97-AF65-F5344CB8AC3E}">
+        <p14:creationId xmlns:p14="http://schemas.microsoft.com/office/powerpoint/2010/main" val="595006982"/>
+      </p:ext>
+    </p:extLst>
+  </p:cSld>
+  <p:clrMapOvr>
+    <a:masterClrMapping/>
+  </p:clrMapOvr>
+  <mc:AlternateContent xmlns:mc="http://schemas.openxmlformats.org/markup-compatibility/2006" xmlns:p14="http://schemas.microsoft.com/office/powerpoint/2010/main">
+    <mc:Choice Requires="p14">
+      <p:transition spd="med" p14:dur="700">
+        <p:fade/>
+      </p:transition>
+    </mc:Choice>
+    <mc:Fallback xmlns="">
+      <p:transition spd="med">
+        <p:fade/>
+      </p:transition>
+    </mc:Fallback>
+  </mc:AlternateContent>
+</p:sld>
+</file>
+
+<file path=ppt/slides/slide7.xml><?xml version="1.0" encoding="utf-8"?>
+<p:sld xmlns:a="http://schemas.openxmlformats.org/drawingml/2006/main" xmlns:r="http://schemas.openxmlformats.org/officeDocument/2006/relationships" xmlns:p="http://schemas.openxmlformats.org/presentationml/2006/main">
+  <p:cSld>
+    <p:spTree>
+      <p:nvGrpSpPr>
+        <p:cNvPr id="1" name=""/>
+        <p:cNvGrpSpPr/>
+        <p:nvPr/>
+      </p:nvGrpSpPr>
+      <p:grpSpPr>
+        <a:xfrm>
+          <a:off x="0" y="0"/>
+          <a:ext cx="0" cy="0"/>
+          <a:chOff x="0" y="0"/>
+          <a:chExt cx="0" cy="0"/>
+        </a:xfrm>
+      </p:grpSpPr>
+      <p:sp>
+        <p:nvSpPr>
           <p:cNvPr id="2" name="Title 1"/>
           <p:cNvSpPr>
             <a:spLocks noGrp="1"/>
@@ -11733,7 +12013,7 @@
 </p:sld>
 </file>
 
-<file path=ppt/slides/slide7.xml><?xml version="1.0" encoding="utf-8"?>
+<file path=ppt/slides/slide8.xml><?xml version="1.0" encoding="utf-8"?>
 <p:sld xmlns:a="http://schemas.openxmlformats.org/drawingml/2006/main" xmlns:r="http://schemas.openxmlformats.org/officeDocument/2006/relationships" xmlns:p="http://schemas.openxmlformats.org/presentationml/2006/main">
   <p:cSld>
     <p:spTree>
@@ -11775,7 +12055,7 @@
 </p:sld>
 </file>
 
-<file path=ppt/slides/slide8.xml><?xml version="1.0" encoding="utf-8"?>
+<file path=ppt/slides/slide9.xml><?xml version="1.0" encoding="utf-8"?>
 <p:sld xmlns:a="http://schemas.openxmlformats.org/drawingml/2006/main" xmlns:r="http://schemas.openxmlformats.org/officeDocument/2006/relationships" xmlns:p="http://schemas.openxmlformats.org/presentationml/2006/main">
   <p:cSld>
     <p:spTree>
@@ -12098,146 +12378,6 @@
     <p:extLst>
       <p:ext uri="{BB962C8B-B14F-4D97-AF65-F5344CB8AC3E}">
         <p14:creationId xmlns:p14="http://schemas.microsoft.com/office/powerpoint/2010/main" val="114171940"/>
-      </p:ext>
-    </p:extLst>
-  </p:cSld>
-  <p:clrMapOvr>
-    <a:masterClrMapping/>
-  </p:clrMapOvr>
-  <mc:AlternateContent xmlns:mc="http://schemas.openxmlformats.org/markup-compatibility/2006" xmlns:p14="http://schemas.microsoft.com/office/powerpoint/2010/main">
-    <mc:Choice Requires="p14">
-      <p:transition spd="med" p14:dur="700">
-        <p:fade/>
-      </p:transition>
-    </mc:Choice>
-    <mc:Fallback xmlns="">
-      <p:transition spd="med">
-        <p:fade/>
-      </p:transition>
-    </mc:Fallback>
-  </mc:AlternateContent>
-</p:sld>
-</file>
-
-<file path=ppt/slides/slide9.xml><?xml version="1.0" encoding="utf-8"?>
-<p:sld xmlns:a="http://schemas.openxmlformats.org/drawingml/2006/main" xmlns:r="http://schemas.openxmlformats.org/officeDocument/2006/relationships" xmlns:p="http://schemas.openxmlformats.org/presentationml/2006/main">
-  <p:cSld>
-    <p:spTree>
-      <p:nvGrpSpPr>
-        <p:cNvPr id="1" name=""/>
-        <p:cNvGrpSpPr/>
-        <p:nvPr/>
-      </p:nvGrpSpPr>
-      <p:grpSpPr>
-        <a:xfrm>
-          <a:off x="0" y="0"/>
-          <a:ext cx="0" cy="0"/>
-          <a:chOff x="0" y="0"/>
-          <a:chExt cx="0" cy="0"/>
-        </a:xfrm>
-      </p:grpSpPr>
-      <p:sp>
-        <p:nvSpPr>
-          <p:cNvPr id="2" name="Title 1"/>
-          <p:cNvSpPr>
-            <a:spLocks noGrp="1"/>
-          </p:cNvSpPr>
-          <p:nvPr>
-            <p:ph type="title"/>
-          </p:nvPr>
-        </p:nvSpPr>
-        <p:spPr/>
-        <p:txBody>
-          <a:bodyPr/>
-          <a:lstStyle/>
-          <a:p>
-            <a:r>
-              <a:rPr lang="en-US" dirty="0"/>
-              <a:t>Add a Slide Title - 2</a:t>
-            </a:r>
-          </a:p>
-        </p:txBody>
-      </p:sp>
-      <p:sp>
-        <p:nvSpPr>
-          <p:cNvPr id="3" name="Text Placeholder 2"/>
-          <p:cNvSpPr>
-            <a:spLocks noGrp="1"/>
-          </p:cNvSpPr>
-          <p:nvPr>
-            <p:ph type="body" idx="1"/>
-          </p:nvPr>
-        </p:nvSpPr>
-        <p:spPr/>
-        <p:txBody>
-          <a:bodyPr/>
-          <a:lstStyle/>
-          <a:p>
-            <a:endParaRPr lang="en-US"/>
-          </a:p>
-        </p:txBody>
-      </p:sp>
-      <p:sp>
-        <p:nvSpPr>
-          <p:cNvPr id="4" name="Content Placeholder 3"/>
-          <p:cNvSpPr>
-            <a:spLocks noGrp="1"/>
-          </p:cNvSpPr>
-          <p:nvPr>
-            <p:ph sz="half" idx="2"/>
-          </p:nvPr>
-        </p:nvSpPr>
-        <p:spPr/>
-        <p:txBody>
-          <a:bodyPr/>
-          <a:lstStyle/>
-          <a:p>
-            <a:endParaRPr lang="en-US"/>
-          </a:p>
-        </p:txBody>
-      </p:sp>
-      <p:sp>
-        <p:nvSpPr>
-          <p:cNvPr id="5" name="Text Placeholder 4"/>
-          <p:cNvSpPr>
-            <a:spLocks noGrp="1"/>
-          </p:cNvSpPr>
-          <p:nvPr>
-            <p:ph type="body" sz="quarter" idx="3"/>
-          </p:nvPr>
-        </p:nvSpPr>
-        <p:spPr/>
-        <p:txBody>
-          <a:bodyPr/>
-          <a:lstStyle/>
-          <a:p>
-            <a:endParaRPr lang="en-US"/>
-          </a:p>
-        </p:txBody>
-      </p:sp>
-      <p:sp>
-        <p:nvSpPr>
-          <p:cNvPr id="6" name="Content Placeholder 5"/>
-          <p:cNvSpPr>
-            <a:spLocks noGrp="1"/>
-          </p:cNvSpPr>
-          <p:nvPr>
-            <p:ph sz="quarter" idx="4"/>
-          </p:nvPr>
-        </p:nvSpPr>
-        <p:spPr/>
-        <p:txBody>
-          <a:bodyPr/>
-          <a:lstStyle/>
-          <a:p>
-            <a:endParaRPr lang="en-US"/>
-          </a:p>
-        </p:txBody>
-      </p:sp>
-    </p:spTree>
-    <p:extLst>
-      <p:ext uri="{BB962C8B-B14F-4D97-AF65-F5344CB8AC3E}">
-        <p14:creationId xmlns:p14="http://schemas.microsoft.com/office/powerpoint/2010/main" val="533970288"/>
       </p:ext>
     </p:extLst>
   </p:cSld>

</xml_diff>